<commit_message>
Final draft for printing
</commit_message>
<xml_diff>
--- a/poster/bourque_aas_poster.pptx
+++ b/poster/bourque_aas_poster.pptx
@@ -2063,21 +2063,7 @@
                 <a:latin typeface="Avenir Book"/>
                 <a:cs typeface="Avenir Book"/>
               </a:rPr>
-              <a:t>Bayesian atmospheric retrievals will be critical to the robust determination of exoplanetary atmospheric properties in the JWST era and beyond. However, some groups may be challenged by the need of programming expertise and/or computational resources required to perform such retrievals, thus limiting their ability to participate scientifically.  The Exoplanet Characterization Toolkit (</a:t>
-            </a:r>
-            <a:r>
-              <a:rPr lang="en-US" sz="2965" dirty="0" err="1">
-                <a:latin typeface="Avenir Book"/>
-                <a:cs typeface="Avenir Book"/>
-              </a:rPr>
-              <a:t>ExoCTK</a:t>
-            </a:r>
-            <a:r>
-              <a:rPr lang="en-US" sz="2965" dirty="0">
-                <a:latin typeface="Avenir Book"/>
-                <a:cs typeface="Avenir Book"/>
-              </a:rPr>
-              <a:t>), which is an open-source data analysis software package and web application focused on the atmospheric characterization of exoplanets and time-series observation planning, aims to address these challenges by developing a module that performs atmospheric retrievals using GPU-enabled Amazon Web Services (AWS) EC2 instances.  Here we present the design, usage, and results of this software.</a:t>
+              <a:t>Bayesian atmospheric retrievals will be critical to the robust determination of exoplanetary atmospheric properties in the JWST era and beyond. However, some groups may be challenged by the need of programming expertise and/or computational resources required to perform such retrievals, thus limiting their ability to participate scientifically.  The Exoplanet Characterization Toolkit (ExoCTK), which is an open-source data analysis software package and web application focused on the atmospheric characterization of exoplanets and time-series observation planning, aims to address these challenges by developing a module that performs atmospheric retrievals using GPU-enabled Amazon Web Services (AWS) EC2 instances.  Here we present the design, usage, and results of this software.</a:t>
             </a:r>
             <a:endParaRPr sz="2965" dirty="0">
               <a:latin typeface="Avenir Book"/>
@@ -2094,8 +2080,8 @@
         </p:nvSpPr>
         <p:spPr>
           <a:xfrm>
-            <a:off x="996899" y="7429897"/>
-            <a:ext cx="15216468" cy="587828"/>
+            <a:off x="545011" y="7429897"/>
+            <a:ext cx="15428031" cy="304439"/>
           </a:xfrm>
           <a:prstGeom prst="rect">
             <a:avLst/>
@@ -2116,17 +2102,7 @@
                 <a:latin typeface="Avenir Black"/>
                 <a:cs typeface="Avenir Black"/>
               </a:rPr>
-              <a:t>1. </a:t>
-            </a:r>
-            <a:r>
-              <a:rPr lang="en-US" sz="3771" spc="8" dirty="0" err="1">
-                <a:solidFill>
-                  <a:srgbClr val="1E68AE"/>
-                </a:solidFill>
-                <a:latin typeface="Avenir Black"/>
-                <a:cs typeface="Avenir Black"/>
-              </a:rPr>
-              <a:t>ExoCTK</a:t>
+              <a:t>1. ExoCTK</a:t>
             </a:r>
             <a:endParaRPr sz="3771" dirty="0">
               <a:solidFill>
@@ -2146,8 +2122,8 @@
         </p:nvSpPr>
         <p:spPr>
           <a:xfrm>
-            <a:off x="17075050" y="16772306"/>
-            <a:ext cx="15216468" cy="587828"/>
+            <a:off x="16807855" y="16772306"/>
+            <a:ext cx="15783973" cy="709249"/>
           </a:xfrm>
           <a:prstGeom prst="rect">
             <a:avLst/>
@@ -2223,47 +2199,7 @@
                 <a:latin typeface="Avenir Book"/>
                 <a:cs typeface="Avenir Book"/>
               </a:rPr>
-              <a:t>, Kevin Stevenson, Joseph </a:t>
-            </a:r>
-            <a:r>
-              <a:rPr lang="en-US" sz="3771" spc="-34" dirty="0" err="1">
-                <a:solidFill>
-                  <a:schemeClr val="bg1"/>
-                </a:solidFill>
-                <a:latin typeface="Avenir Book"/>
-                <a:cs typeface="Avenir Book"/>
-              </a:rPr>
-              <a:t>Filippazzo</a:t>
-            </a:r>
-            <a:r>
-              <a:rPr lang="en-US" sz="3771" spc="-34" dirty="0">
-                <a:solidFill>
-                  <a:schemeClr val="bg1"/>
-                </a:solidFill>
-                <a:latin typeface="Avenir Book"/>
-                <a:cs typeface="Avenir Book"/>
-              </a:rPr>
-              <a:t>, and the </a:t>
-            </a:r>
-            <a:r>
-              <a:rPr lang="en-US" sz="3771" spc="-34" dirty="0" err="1">
-                <a:solidFill>
-                  <a:schemeClr val="bg1"/>
-                </a:solidFill>
-                <a:latin typeface="Avenir Book"/>
-                <a:cs typeface="Avenir Book"/>
-              </a:rPr>
-              <a:t>ExoCTK</a:t>
-            </a:r>
-            <a:r>
-              <a:rPr lang="en-US" sz="3771" spc="-34" dirty="0">
-                <a:solidFill>
-                  <a:schemeClr val="bg1"/>
-                </a:solidFill>
-                <a:latin typeface="Avenir Book"/>
-                <a:cs typeface="Avenir Book"/>
-              </a:rPr>
-              <a:t> team</a:t>
+              <a:t>, Kevin Stevenson, Joseph Filippazzo, and the ExoCTK team</a:t>
             </a:r>
             <a:endParaRPr lang="en-US" sz="3771" spc="-77" dirty="0">
               <a:solidFill>
@@ -2283,8 +2219,8 @@
         </p:nvSpPr>
         <p:spPr>
           <a:xfrm rot="5400000" flipV="1">
-            <a:off x="5707191" y="19260181"/>
-            <a:ext cx="22121725" cy="515141"/>
+            <a:off x="5430271" y="18983261"/>
+            <a:ext cx="22702325" cy="488381"/>
           </a:xfrm>
           <a:custGeom>
             <a:avLst/>
@@ -2363,39 +2299,13 @@
                 <a:latin typeface="Avenir Book" panose="02000503020000020003" pitchFamily="2" charset="0"/>
                 <a:cs typeface="Avenir Book"/>
               </a:rPr>
-              <a:t>The Exoplanet Characterization Toolkit (</a:t>
-            </a:r>
-            <a:r>
-              <a:rPr lang="en-US" sz="2742" dirty="0" err="1">
-                <a:latin typeface="Avenir Book" panose="02000503020000020003" pitchFamily="2" charset="0"/>
-                <a:cs typeface="Avenir Book"/>
-              </a:rPr>
-              <a:t>ExoCTK</a:t>
+              <a:t>The Exoplanet Characterization Toolkit (ExoCTK) </a:t>
             </a:r>
             <a:r>
               <a:rPr lang="en-US" sz="2742" dirty="0">
                 <a:latin typeface="Avenir Book" panose="02000503020000020003" pitchFamily="2" charset="0"/>
-                <a:cs typeface="Avenir Book"/>
-              </a:rPr>
-              <a:t>) </a:t>
-            </a:r>
-            <a:r>
-              <a:rPr lang="en-US" sz="2742" dirty="0">
-                <a:latin typeface="Avenir Book" panose="02000503020000020003" pitchFamily="2" charset="0"/>
-              </a:rPr>
-              <a:t>is a python-based, open-source software package and web application focused on the time-series observation planning and data analysis of exoplanets.  </a:t>
-            </a:r>
-            <a:r>
-              <a:rPr lang="en-US" sz="2742" dirty="0" err="1">
-                <a:latin typeface="Avenir Book" panose="02000503020000020003" pitchFamily="2" charset="0"/>
-              </a:rPr>
-              <a:t>ExoCTK</a:t>
-            </a:r>
-            <a:r>
-              <a:rPr lang="en-US" sz="2742" dirty="0">
-                <a:latin typeface="Avenir Book" panose="02000503020000020003" pitchFamily="2" charset="0"/>
-              </a:rPr>
-              <a:t> is available on the web at </a:t>
+              </a:rPr>
+              <a:t>is a python-based, open-source software package and web application focused on the time-series observation planning and data analysis of exoplanets.  ExoCTK is available on the web at </a:t>
             </a:r>
             <a:r>
               <a:rPr lang="en-US" sz="2742" dirty="0">
@@ -2475,35 +2385,21 @@
               <a:t>Atmospheric Retrievals are algorithms used to determine the physical parameters of an exoplanetary atmosphere.  The </a:t>
             </a:r>
             <a:r>
-              <a:rPr lang="en-US" sz="2742" dirty="0" err="1">
-                <a:latin typeface="Courier" pitchFamily="2" charset="0"/>
-                <a:cs typeface="Avenir Book"/>
-              </a:rPr>
-              <a:t>atmospheric_retrievals</a:t>
-            </a:r>
-            <a:r>
               <a:rPr lang="en-US" sz="2742" dirty="0">
                 <a:latin typeface="Courier" pitchFamily="2" charset="0"/>
                 <a:cs typeface="Avenir Book"/>
               </a:rPr>
-              <a:t> </a:t>
-            </a:r>
-            <a:r>
-              <a:rPr lang="en-US" sz="2742" dirty="0" err="1">
-                <a:latin typeface="Avenir Book"/>
-                <a:cs typeface="Avenir Book"/>
-              </a:rPr>
-              <a:t>subpackage</a:t>
+              <a:t>atmospheric_retrievals </a:t>
             </a:r>
             <a:r>
               <a:rPr lang="en-US" sz="2742" dirty="0">
                 <a:latin typeface="Avenir Book"/>
                 <a:cs typeface="Avenir Book"/>
               </a:rPr>
-              <a:t> within the </a:t>
-            </a:r>
-            <a:r>
-              <a:rPr lang="en-US" sz="2742" dirty="0" err="1">
+              <a:t>subpackage within the </a:t>
+            </a:r>
+            <a:r>
+              <a:rPr lang="en-US" sz="2742" dirty="0">
                 <a:latin typeface="Courier" pitchFamily="2" charset="0"/>
                 <a:cs typeface="Avenir Book"/>
               </a:rPr>
@@ -2514,49 +2410,28 @@
                 <a:latin typeface="Avenir Book"/>
                 <a:cs typeface="Avenir Book"/>
               </a:rPr>
-              <a:t> repository contains methods and tools for performing retrievals with PLATON (</a:t>
-            </a:r>
-            <a:r>
-              <a:rPr lang="en-US" sz="2742" dirty="0" err="1">
+              <a:t> repository contains methods and tools for performing retrievals with PLATON (PLanetary Atmospheric Transmission for Observer Noobs)</a:t>
+            </a:r>
+            <a:r>
+              <a:rPr lang="en-US" sz="2742" baseline="30000" dirty="0">
                 <a:latin typeface="Avenir Book"/>
                 <a:cs typeface="Avenir Book"/>
               </a:rPr>
-              <a:t>PLanetary</a:t>
+              <a:t>1</a:t>
             </a:r>
             <a:r>
               <a:rPr lang="en-US" sz="2742" dirty="0">
                 <a:latin typeface="Avenir Book"/>
                 <a:cs typeface="Avenir Book"/>
               </a:rPr>
-              <a:t> Atmospheric Transmission for Observer Noobs)</a:t>
-            </a:r>
-            <a:r>
-              <a:rPr lang="en-US" sz="2742" baseline="30000" dirty="0">
-                <a:latin typeface="Avenir Book"/>
-                <a:cs typeface="Avenir Book"/>
-              </a:rPr>
-              <a:t>1</a:t>
-            </a:r>
-            <a:r>
-              <a:rPr lang="en-US" sz="2742" dirty="0">
-                <a:latin typeface="Avenir Book"/>
-                <a:cs typeface="Avenir Book"/>
-              </a:rPr>
               <a:t>.  Users can choose to performing retrievals on a local machine, or on virtual machines located in the cloud on the Amazon Web Services (AWS) Elastic Computing (EC2) platform by properly configuring an EC2 instance and invoking the </a:t>
-            </a:r>
-            <a:r>
-              <a:rPr lang="en-US" sz="2742" dirty="0" err="1">
-                <a:latin typeface="Courier" pitchFamily="2" charset="0"/>
-                <a:cs typeface="Avenir Book"/>
-              </a:rPr>
-              <a:t>use_aws</a:t>
             </a:r>
             <a:r>
               <a:rPr lang="en-US" sz="2742" dirty="0">
                 <a:latin typeface="Courier" pitchFamily="2" charset="0"/>
                 <a:cs typeface="Avenir Book"/>
               </a:rPr>
-              <a:t>() </a:t>
+              <a:t>use_aws() </a:t>
             </a:r>
             <a:r>
               <a:rPr lang="en-US" sz="2742" dirty="0">
@@ -2825,8 +2700,8 @@
         </p:nvSpPr>
         <p:spPr>
           <a:xfrm>
-            <a:off x="1022403" y="10350213"/>
-            <a:ext cx="15088483" cy="678542"/>
+            <a:off x="336569" y="10350213"/>
+            <a:ext cx="15797816" cy="735903"/>
           </a:xfrm>
           <a:prstGeom prst="rect">
             <a:avLst/>
@@ -2890,8 +2765,8 @@
         </p:nvSpPr>
         <p:spPr>
           <a:xfrm>
-            <a:off x="16794407" y="7401157"/>
-            <a:ext cx="15216468" cy="773228"/>
+            <a:off x="16923473" y="7401157"/>
+            <a:ext cx="15668356" cy="876760"/>
           </a:xfrm>
           <a:prstGeom prst="rect">
             <a:avLst/>
@@ -2938,8 +2813,8 @@
         </p:nvSpPr>
         <p:spPr>
           <a:xfrm>
-            <a:off x="17065663" y="28101730"/>
-            <a:ext cx="15216468" cy="587828"/>
+            <a:off x="16807856" y="28101729"/>
+            <a:ext cx="15783972" cy="696647"/>
           </a:xfrm>
           <a:prstGeom prst="rect">
             <a:avLst/>
@@ -3237,35 +3112,32 @@
                 <a:latin typeface="Avenir Book"/>
                 <a:cs typeface="Avenir Book"/>
               </a:rPr>
-              <a:t>Support for this project was provided by the </a:t>
-            </a:r>
-            <a:r>
-              <a:rPr lang="en-US" sz="2742" dirty="0" err="1">
-                <a:latin typeface="Avenir Book"/>
-                <a:cs typeface="Avenir Book"/>
-              </a:rPr>
-              <a:t>STScI</a:t>
-            </a:r>
+              <a:t>Support for this project was provided by the STScI Director’s Research Fund and the 2019 STScI Data Science Innovation Initiative.</a:t>
+            </a:r>
+          </a:p>
+          <a:p>
+            <a:pPr marL="544594" indent="-544594" algn="just">
+              <a:buAutoNum type="arabicPeriod"/>
+            </a:pPr>
             <a:r>
               <a:rPr lang="en-US" sz="2742" dirty="0">
                 <a:latin typeface="Avenir Book"/>
                 <a:cs typeface="Avenir Book"/>
               </a:rPr>
-              <a:t> Director’s Research Fund and the 2019 </a:t>
-            </a:r>
-            <a:r>
-              <a:rPr lang="en-US" sz="2742" dirty="0" err="1">
-                <a:latin typeface="Avenir Book"/>
-                <a:cs typeface="Avenir Book"/>
-              </a:rPr>
-              <a:t>STScI</a:t>
+              <a:t>For more information on PLATON, see </a:t>
             </a:r>
             <a:r>
               <a:rPr lang="en-US" sz="2742" dirty="0">
-                <a:latin typeface="Avenir Book"/>
-                <a:cs typeface="Avenir Book"/>
-              </a:rPr>
-              <a:t> Data Science Innovation Initiative.</a:t>
+                <a:latin typeface="Avenir Book" panose="02000503020000020003" pitchFamily="2" charset="0"/>
+                <a:hlinkClick r:id="rId15"/>
+              </a:rPr>
+              <a:t>https://platon.readthedocs.io/</a:t>
+            </a:r>
+            <a:r>
+              <a:rPr lang="en-US" sz="2742" dirty="0">
+                <a:latin typeface="Avenir Book" panose="02000503020000020003" pitchFamily="2" charset="0"/>
+              </a:rPr>
+              <a:t>.</a:t>
             </a:r>
           </a:p>
           <a:p>
@@ -3274,46 +3146,9 @@
             </a:pPr>
             <a:r>
               <a:rPr lang="en-US" sz="2742" dirty="0">
-                <a:latin typeface="Avenir Book"/>
-                <a:cs typeface="Avenir Book"/>
-              </a:rPr>
-              <a:t>For more information on PLATON, see </a:t>
-            </a:r>
-            <a:r>
-              <a:rPr lang="en-US" sz="2742" dirty="0">
                 <a:latin typeface="Avenir Book" panose="02000503020000020003" pitchFamily="2" charset="0"/>
-                <a:hlinkClick r:id="rId15"/>
-              </a:rPr>
-              <a:t>https://platon.readthedocs.io/</a:t>
-            </a:r>
-            <a:r>
-              <a:rPr lang="en-US" sz="2742" dirty="0">
-                <a:latin typeface="Avenir Book" panose="02000503020000020003" pitchFamily="2" charset="0"/>
-              </a:rPr>
-              <a:t>.</a:t>
-            </a:r>
-          </a:p>
-          <a:p>
-            <a:pPr marL="544594" indent="-544594" algn="just">
-              <a:buAutoNum type="arabicPeriod"/>
-            </a:pPr>
-            <a:r>
-              <a:rPr lang="en-US" sz="2742" dirty="0">
-                <a:latin typeface="Avenir Book" panose="02000503020000020003" pitchFamily="2" charset="0"/>
-              </a:rPr>
-              <a:t>Transmission spectra were acquired from </a:t>
-            </a:r>
-            <a:r>
-              <a:rPr lang="en-US" sz="2742" dirty="0" err="1">
-                <a:latin typeface="Avenir Book" panose="02000503020000020003" pitchFamily="2" charset="0"/>
-              </a:rPr>
-              <a:t>ExoMAST</a:t>
-            </a:r>
-            <a:r>
-              <a:rPr lang="en-US" sz="2742" dirty="0">
-                <a:latin typeface="Avenir Book" panose="02000503020000020003" pitchFamily="2" charset="0"/>
-              </a:rPr>
-              <a:t>, available at </a:t>
+              </a:rPr>
+              <a:t>Transmission spectra were acquired from ExoMAST, available at </a:t>
             </a:r>
             <a:r>
               <a:rPr lang="en-US" sz="2742" dirty="0">
@@ -3722,21 +3557,7 @@
                 <a:latin typeface="Avenir Book"/>
                 <a:cs typeface="Avenir Book"/>
               </a:rPr>
-              <a:t>A web interface for performing retrievals, akin to other </a:t>
-            </a:r>
-            <a:r>
-              <a:rPr lang="en-US" sz="2742" dirty="0" err="1">
-                <a:latin typeface="Avenir Book"/>
-                <a:cs typeface="Avenir Book"/>
-              </a:rPr>
-              <a:t>ExoCTK</a:t>
-            </a:r>
-            <a:r>
-              <a:rPr lang="en-US" sz="2742" dirty="0">
-                <a:latin typeface="Avenir Book"/>
-                <a:cs typeface="Avenir Book"/>
-              </a:rPr>
-              <a:t> web tools</a:t>
+              <a:t>A web interface for performing retrievals, akin to other ExoCTK web tools</a:t>
             </a:r>
           </a:p>
         </p:txBody>
@@ -3782,7 +3603,7 @@
                 <a:latin typeface="Avenir Book"/>
                 <a:cs typeface="Avenir Book"/>
               </a:rPr>
-              <a:t>Support for other retrieval algorithms, namely CHIMERA (Caltech Inverse Modeling and Retrieval Algorithms</a:t>
+              <a:t>Support for other retrieval algorithms, namely CHIMERA (Caltech Inverse Modeling and Retrieval Algorithms)</a:t>
             </a:r>
           </a:p>
           <a:p>

</xml_diff>